<commit_message>
Few minor bug fixes
</commit_message>
<xml_diff>
--- a/Lectures/Game Engines 7.pptx
+++ b/Lectures/Game Engines 7.pptx
@@ -214,7 +214,7 @@
           <a:p>
             <a:fld id="{D3D2ECF1-FB08-48FC-B45D-807F443755F4}" type="datetimeFigureOut">
               <a:rPr lang="en-IE" smtClean="0"/>
-              <a:t>07/11/2013</a:t>
+              <a:t>08/11/2013</a:t>
             </a:fld>
             <a:endParaRPr lang="en-IE"/>
           </a:p>
@@ -379,7 +379,7 @@
           <a:p>
             <a:fld id="{741081DE-5AEF-4FAD-BA62-F267E0B801CD}" type="datetimeFigureOut">
               <a:rPr lang="en-IE" smtClean="0"/>
-              <a:t>07/11/2013</a:t>
+              <a:t>08/11/2013</a:t>
             </a:fld>
             <a:endParaRPr lang="en-IE"/>
           </a:p>
@@ -1045,7 +1045,7 @@
         <p:nvSpPr>
           <p:cNvPr id="49155" name="Rectangle 2"/>
           <p:cNvSpPr>
-            <a:spLocks noRot="1" noChangeArrowheads="1" noTextEdit="1"/>
+            <a:spLocks noGrp="1" noRot="1" noChangeAspect="1" noChangeArrowheads="1" noTextEdit="1"/>
           </p:cNvSpPr>
           <p:nvPr>
             <p:ph type="sldImg"/>
@@ -1274,7 +1274,7 @@
         <p:nvSpPr>
           <p:cNvPr id="50179" name="Rectangle 2"/>
           <p:cNvSpPr>
-            <a:spLocks noRot="1" noChangeArrowheads="1" noTextEdit="1"/>
+            <a:spLocks noGrp="1" noRot="1" noChangeAspect="1" noChangeArrowheads="1" noTextEdit="1"/>
           </p:cNvSpPr>
           <p:nvPr>
             <p:ph type="sldImg"/>
@@ -1503,7 +1503,7 @@
         <p:nvSpPr>
           <p:cNvPr id="51203" name="Rectangle 2"/>
           <p:cNvSpPr>
-            <a:spLocks noRot="1" noChangeArrowheads="1" noTextEdit="1"/>
+            <a:spLocks noGrp="1" noRot="1" noChangeAspect="1" noChangeArrowheads="1" noTextEdit="1"/>
           </p:cNvSpPr>
           <p:nvPr>
             <p:ph type="sldImg"/>
@@ -1732,7 +1732,7 @@
         <p:nvSpPr>
           <p:cNvPr id="52227" name="Rectangle 2"/>
           <p:cNvSpPr>
-            <a:spLocks noRot="1" noChangeArrowheads="1" noTextEdit="1"/>
+            <a:spLocks noGrp="1" noRot="1" noChangeAspect="1" noChangeArrowheads="1" noTextEdit="1"/>
           </p:cNvSpPr>
           <p:nvPr>
             <p:ph type="sldImg"/>
@@ -1961,7 +1961,7 @@
         <p:nvSpPr>
           <p:cNvPr id="53251" name="Rectangle 2"/>
           <p:cNvSpPr>
-            <a:spLocks noRot="1" noChangeArrowheads="1" noTextEdit="1"/>
+            <a:spLocks noGrp="1" noRot="1" noChangeAspect="1" noChangeArrowheads="1" noTextEdit="1"/>
           </p:cNvSpPr>
           <p:nvPr>
             <p:ph type="sldImg"/>
@@ -2194,7 +2194,7 @@
         <p:nvSpPr>
           <p:cNvPr id="35843" name="Rectangle 2"/>
           <p:cNvSpPr>
-            <a:spLocks noRot="1" noChangeArrowheads="1" noTextEdit="1"/>
+            <a:spLocks noGrp="1" noRot="1" noChangeAspect="1" noChangeArrowheads="1" noTextEdit="1"/>
           </p:cNvSpPr>
           <p:nvPr>
             <p:ph type="sldImg"/>
@@ -2423,7 +2423,7 @@
         <p:nvSpPr>
           <p:cNvPr id="36867" name="Rectangle 2"/>
           <p:cNvSpPr>
-            <a:spLocks noRot="1" noChangeArrowheads="1" noTextEdit="1"/>
+            <a:spLocks noGrp="1" noRot="1" noChangeAspect="1" noChangeArrowheads="1" noTextEdit="1"/>
           </p:cNvSpPr>
           <p:nvPr>
             <p:ph type="sldImg"/>
@@ -2652,7 +2652,7 @@
         <p:nvSpPr>
           <p:cNvPr id="41987" name="Rectangle 2"/>
           <p:cNvSpPr>
-            <a:spLocks noRot="1" noChangeArrowheads="1" noTextEdit="1"/>
+            <a:spLocks noGrp="1" noRot="1" noChangeAspect="1" noChangeArrowheads="1" noTextEdit="1"/>
           </p:cNvSpPr>
           <p:nvPr>
             <p:ph type="sldImg"/>
@@ -2881,7 +2881,7 @@
         <p:nvSpPr>
           <p:cNvPr id="43011" name="Rectangle 2"/>
           <p:cNvSpPr>
-            <a:spLocks noRot="1" noChangeArrowheads="1" noTextEdit="1"/>
+            <a:spLocks noGrp="1" noRot="1" noChangeAspect="1" noChangeArrowheads="1" noTextEdit="1"/>
           </p:cNvSpPr>
           <p:nvPr>
             <p:ph type="sldImg"/>
@@ -3110,7 +3110,7 @@
         <p:nvSpPr>
           <p:cNvPr id="44035" name="Rectangle 2"/>
           <p:cNvSpPr>
-            <a:spLocks noRot="1" noChangeArrowheads="1" noTextEdit="1"/>
+            <a:spLocks noGrp="1" noRot="1" noChangeAspect="1" noChangeArrowheads="1" noTextEdit="1"/>
           </p:cNvSpPr>
           <p:nvPr>
             <p:ph type="sldImg"/>
@@ -3339,7 +3339,7 @@
         <p:nvSpPr>
           <p:cNvPr id="45059" name="Rectangle 2"/>
           <p:cNvSpPr>
-            <a:spLocks noRot="1" noChangeArrowheads="1" noTextEdit="1"/>
+            <a:spLocks noGrp="1" noRot="1" noChangeAspect="1" noChangeArrowheads="1" noTextEdit="1"/>
           </p:cNvSpPr>
           <p:nvPr>
             <p:ph type="sldImg"/>
@@ -3568,7 +3568,7 @@
         <p:nvSpPr>
           <p:cNvPr id="46083" name="Rectangle 2"/>
           <p:cNvSpPr>
-            <a:spLocks noRot="1" noChangeArrowheads="1" noTextEdit="1"/>
+            <a:spLocks noGrp="1" noRot="1" noChangeAspect="1" noChangeArrowheads="1" noTextEdit="1"/>
           </p:cNvSpPr>
           <p:nvPr>
             <p:ph type="sldImg"/>
@@ -3797,7 +3797,7 @@
         <p:nvSpPr>
           <p:cNvPr id="47107" name="Rectangle 2"/>
           <p:cNvSpPr>
-            <a:spLocks noRot="1" noChangeArrowheads="1" noTextEdit="1"/>
+            <a:spLocks noGrp="1" noRot="1" noChangeAspect="1" noChangeArrowheads="1" noTextEdit="1"/>
           </p:cNvSpPr>
           <p:nvPr>
             <p:ph type="sldImg"/>
@@ -4038,7 +4038,7 @@
           <a:p>
             <a:fld id="{3A1FCA75-51D1-4143-BA71-9D0DBE509351}" type="datetimeFigureOut">
               <a:rPr lang="en-IE" smtClean="0"/>
-              <a:t>07/11/2013</a:t>
+              <a:t>08/11/2013</a:t>
             </a:fld>
             <a:endParaRPr lang="en-IE"/>
           </a:p>
@@ -4208,7 +4208,7 @@
           <a:p>
             <a:fld id="{3A1FCA75-51D1-4143-BA71-9D0DBE509351}" type="datetimeFigureOut">
               <a:rPr lang="en-IE" smtClean="0"/>
-              <a:t>07/11/2013</a:t>
+              <a:t>08/11/2013</a:t>
             </a:fld>
             <a:endParaRPr lang="en-IE"/>
           </a:p>
@@ -4388,7 +4388,7 @@
           <a:p>
             <a:fld id="{3A1FCA75-51D1-4143-BA71-9D0DBE509351}" type="datetimeFigureOut">
               <a:rPr lang="en-IE" smtClean="0"/>
-              <a:t>07/11/2013</a:t>
+              <a:t>08/11/2013</a:t>
             </a:fld>
             <a:endParaRPr lang="en-IE"/>
           </a:p>
@@ -4558,7 +4558,7 @@
           <a:p>
             <a:fld id="{3A1FCA75-51D1-4143-BA71-9D0DBE509351}" type="datetimeFigureOut">
               <a:rPr lang="en-IE" smtClean="0"/>
-              <a:t>07/11/2013</a:t>
+              <a:t>08/11/2013</a:t>
             </a:fld>
             <a:endParaRPr lang="en-IE"/>
           </a:p>
@@ -4845,7 +4845,7 @@
           <a:p>
             <a:fld id="{3A1FCA75-51D1-4143-BA71-9D0DBE509351}" type="datetimeFigureOut">
               <a:rPr lang="en-IE" smtClean="0"/>
-              <a:t>07/11/2013</a:t>
+              <a:t>08/11/2013</a:t>
             </a:fld>
             <a:endParaRPr lang="en-IE"/>
           </a:p>
@@ -5133,7 +5133,7 @@
           <a:p>
             <a:fld id="{3A1FCA75-51D1-4143-BA71-9D0DBE509351}" type="datetimeFigureOut">
               <a:rPr lang="en-IE" smtClean="0"/>
-              <a:t>07/11/2013</a:t>
+              <a:t>08/11/2013</a:t>
             </a:fld>
             <a:endParaRPr lang="en-IE"/>
           </a:p>
@@ -5555,7 +5555,7 @@
           <a:p>
             <a:fld id="{3A1FCA75-51D1-4143-BA71-9D0DBE509351}" type="datetimeFigureOut">
               <a:rPr lang="en-IE" smtClean="0"/>
-              <a:t>07/11/2013</a:t>
+              <a:t>08/11/2013</a:t>
             </a:fld>
             <a:endParaRPr lang="en-IE"/>
           </a:p>
@@ -5673,7 +5673,7 @@
           <a:p>
             <a:fld id="{3A1FCA75-51D1-4143-BA71-9D0DBE509351}" type="datetimeFigureOut">
               <a:rPr lang="en-IE" smtClean="0"/>
-              <a:t>07/11/2013</a:t>
+              <a:t>08/11/2013</a:t>
             </a:fld>
             <a:endParaRPr lang="en-IE"/>
           </a:p>
@@ -5768,7 +5768,7 @@
           <a:p>
             <a:fld id="{3A1FCA75-51D1-4143-BA71-9D0DBE509351}" type="datetimeFigureOut">
               <a:rPr lang="en-IE" smtClean="0"/>
-              <a:t>07/11/2013</a:t>
+              <a:t>08/11/2013</a:t>
             </a:fld>
             <a:endParaRPr lang="en-IE"/>
           </a:p>
@@ -6045,7 +6045,7 @@
           <a:p>
             <a:fld id="{3A1FCA75-51D1-4143-BA71-9D0DBE509351}" type="datetimeFigureOut">
               <a:rPr lang="en-IE" smtClean="0"/>
-              <a:t>07/11/2013</a:t>
+              <a:t>08/11/2013</a:t>
             </a:fld>
             <a:endParaRPr lang="en-IE"/>
           </a:p>
@@ -6298,7 +6298,7 @@
           <a:p>
             <a:fld id="{3A1FCA75-51D1-4143-BA71-9D0DBE509351}" type="datetimeFigureOut">
               <a:rPr lang="en-IE" smtClean="0"/>
-              <a:t>07/11/2013</a:t>
+              <a:t>08/11/2013</a:t>
             </a:fld>
             <a:endParaRPr lang="en-IE"/>
           </a:p>
@@ -6511,7 +6511,7 @@
           <a:p>
             <a:fld id="{3A1FCA75-51D1-4143-BA71-9D0DBE509351}" type="datetimeFigureOut">
               <a:rPr lang="en-IE" smtClean="0"/>
-              <a:t>07/11/2013</a:t>
+              <a:t>08/11/2013</a:t>
             </a:fld>
             <a:endParaRPr lang="en-IE"/>
           </a:p>
@@ -7098,7 +7098,11 @@
             </a:r>
             <a:r>
               <a:rPr lang="en-GB" sz="6000" smtClean="0"/>
-              <a:t>Engines 6</a:t>
+              <a:t>Engines </a:t>
+            </a:r>
+            <a:r>
+              <a:rPr lang="en-GB" sz="6000" smtClean="0"/>
+              <a:t>1</a:t>
             </a:r>
             <a:endParaRPr lang="en-GB" sz="6000" dirty="0" smtClean="0"/>
           </a:p>
@@ -7250,15 +7254,7 @@
             </a:pPr>
             <a:r>
               <a:rPr lang="en-US" altLang="en-US" sz="2400" dirty="0" smtClean="0"/>
-              <a:t>The property </a:t>
-            </a:r>
-            <a:r>
-              <a:rPr lang="en-US" altLang="en-US" sz="2400" dirty="0" smtClean="0"/>
-              <a:t>of a body which resists change in its </a:t>
-            </a:r>
-            <a:r>
-              <a:rPr lang="en-US" altLang="en-US" sz="2400" dirty="0" smtClean="0"/>
-              <a:t>motion </a:t>
+              <a:t>The property of a body which resists change in its motion </a:t>
             </a:r>
           </a:p>
           <a:p>
@@ -14125,11 +14121,7 @@
             </a:r>
             <a:r>
               <a:rPr lang="en-GB" altLang="en-US" dirty="0" smtClean="0"/>
-              <a:t>, axis</a:t>
-            </a:r>
-            <a:r>
-              <a:rPr lang="en-GB" altLang="en-US" dirty="0" smtClean="0"/>
-              <a:t>);</a:t>
+              <a:t>, axis);</a:t>
             </a:r>
           </a:p>
           <a:p>
@@ -14360,11 +14352,7 @@
             <a:pPr eaLnBrk="1" hangingPunct="1"/>
             <a:r>
               <a:rPr lang="en-US" altLang="en-US" dirty="0" smtClean="0"/>
-              <a:t>If stability is an issue you can use implicit </a:t>
-            </a:r>
-            <a:r>
-              <a:rPr lang="en-US" altLang="en-US" dirty="0" smtClean="0"/>
-              <a:t>integration:</a:t>
+              <a:t>If stability is an issue you can use implicit integration:</a:t>
             </a:r>
           </a:p>
           <a:p>
@@ -14385,7 +14373,6 @@
               <a:rPr lang="en-US" altLang="en-US" dirty="0" smtClean="0"/>
               <a:t> technique</a:t>
             </a:r>
-            <a:endParaRPr lang="en-US" altLang="en-US" dirty="0" smtClean="0"/>
           </a:p>
           <a:p>
             <a:pPr lvl="1">
@@ -14451,19 +14438,12 @@
               <a:rPr lang="en-US" altLang="en-US" sz="2400" dirty="0" smtClean="0">
                 <a:hlinkClick r:id="rId4"/>
               </a:rPr>
-              <a:t>http</a:t>
-            </a:r>
-            <a:r>
-              <a:rPr lang="en-US" altLang="en-US" sz="2400" dirty="0" smtClean="0">
-                <a:hlinkClick r:id="rId4"/>
-              </a:rPr>
-              <a:t>://www.mech.gla.ac.uk/~peterg/software/MTT/examples/Simulation_rep/node89.html</a:t>
+              <a:t>http://www.mech.gla.ac.uk/~peterg/software/MTT/examples/Simulation_rep/node89.html</a:t>
             </a:r>
             <a:r>
               <a:rPr lang="en-US" altLang="en-US" dirty="0" smtClean="0"/>
               <a:t> </a:t>
             </a:r>
-            <a:endParaRPr lang="en-US" altLang="en-US" dirty="0" smtClean="0"/>
           </a:p>
           <a:p>
             <a:pPr eaLnBrk="1" hangingPunct="1"/>
@@ -14609,15 +14589,7 @@
             </a:pPr>
             <a:r>
               <a:rPr lang="en-IE" altLang="en-US" sz="2400" dirty="0" smtClean="0"/>
-              <a:t>You can use any vector, but </a:t>
-            </a:r>
-            <a:r>
-              <a:rPr lang="en-IE" altLang="en-US" sz="2400" dirty="0" smtClean="0"/>
-              <a:t>BGE uses</a:t>
-            </a:r>
-            <a:r>
-              <a:rPr lang="en-IE" altLang="en-US" sz="2400" dirty="0" smtClean="0"/>
-              <a:t>:</a:t>
+              <a:t>You can use any vector, but BGE uses:</a:t>
             </a:r>
           </a:p>
           <a:p>
@@ -14628,23 +14600,7 @@
             </a:pPr>
             <a:r>
               <a:rPr lang="en-IE" altLang="en-US" sz="2400" dirty="0" smtClean="0"/>
-              <a:t>[0 0 </a:t>
-            </a:r>
-            <a:r>
-              <a:rPr lang="en-IE" altLang="en-US" sz="2400" dirty="0" smtClean="0"/>
-              <a:t>-1</a:t>
-            </a:r>
-            <a:r>
-              <a:rPr lang="en-IE" altLang="en-US" sz="2400" dirty="0" smtClean="0"/>
-              <a:t>] Looking down the </a:t>
-            </a:r>
-            <a:r>
-              <a:rPr lang="en-IE" altLang="en-US" sz="2400" dirty="0" smtClean="0"/>
-              <a:t>negative Z </a:t>
-            </a:r>
-            <a:r>
-              <a:rPr lang="en-IE" altLang="en-US" sz="2400" dirty="0" smtClean="0"/>
-              <a:t>Axis</a:t>
+              <a:t>[0 0 -1] Looking down the negative Z Axis</a:t>
             </a:r>
             <a:endParaRPr lang="en-US" altLang="en-US" sz="2400" dirty="0" smtClean="0"/>
           </a:p>
@@ -14733,17 +14689,12 @@
               <a:rPr lang="en-IE" altLang="en-US" dirty="0" smtClean="0"/>
               <a:t>Calculate</a:t>
             </a:r>
-            <a:endParaRPr lang="en-IE" altLang="en-US" dirty="0" smtClean="0"/>
           </a:p>
           <a:p>
             <a:pPr lvl="1" eaLnBrk="1" hangingPunct="1"/>
             <a:r>
               <a:rPr lang="en-IE" altLang="en-US" dirty="0" smtClean="0"/>
-              <a:t>The axis of </a:t>
-            </a:r>
-            <a:r>
-              <a:rPr lang="en-IE" altLang="en-US" dirty="0" smtClean="0"/>
-              <a:t>rotation</a:t>
+              <a:t>The axis of rotation</a:t>
             </a:r>
           </a:p>
           <a:p>
@@ -14770,17 +14721,12 @@
               <a:rPr lang="en-IE" altLang="en-US" dirty="0" smtClean="0"/>
               <a:t>]</a:t>
             </a:r>
-            <a:endParaRPr lang="en-IE" altLang="en-US" dirty="0" smtClean="0"/>
           </a:p>
           <a:p>
             <a:pPr lvl="1" eaLnBrk="1" hangingPunct="1"/>
             <a:r>
               <a:rPr lang="en-IE" altLang="en-US" dirty="0" smtClean="0"/>
-              <a:t>The angle of </a:t>
-            </a:r>
-            <a:r>
-              <a:rPr lang="en-IE" altLang="en-US" dirty="0" smtClean="0"/>
-              <a:t>rotation</a:t>
+              <a:t>The angle of rotation</a:t>
             </a:r>
           </a:p>
           <a:p>
@@ -14831,23 +14777,7 @@
             <a:pPr lvl="1" eaLnBrk="1" hangingPunct="1"/>
             <a:r>
               <a:rPr lang="en-IE" altLang="en-US" dirty="0" smtClean="0"/>
-              <a:t>Rotate </a:t>
-            </a:r>
-            <a:r>
-              <a:rPr lang="en-IE" altLang="en-US" dirty="0" smtClean="0"/>
-              <a:t>the </a:t>
-            </a:r>
-            <a:r>
-              <a:rPr lang="en-IE" altLang="en-US" dirty="0" smtClean="0"/>
-              <a:t>BASIS look vector by </a:t>
-            </a:r>
-            <a:r>
-              <a:rPr lang="en-IE" altLang="en-US" dirty="0" smtClean="0"/>
-              <a:t>the </a:t>
-            </a:r>
-            <a:r>
-              <a:rPr lang="en-IE" altLang="en-US" dirty="0" smtClean="0"/>
-              <a:t>quaternion</a:t>
+              <a:t>Rotate the BASIS look vector by the quaternion</a:t>
             </a:r>
           </a:p>
           <a:p>
@@ -15209,15 +15139,7 @@
             </a:pPr>
             <a:r>
               <a:rPr lang="en-US" altLang="en-US" sz="2400" dirty="0" smtClean="0"/>
-              <a:t>The measure of the force applied to a member to produce rotational motion usually measured in </a:t>
-            </a:r>
-            <a:r>
-              <a:rPr lang="en-US" altLang="en-US" sz="2400" dirty="0" smtClean="0"/>
-              <a:t>meter/kg</a:t>
-            </a:r>
-            <a:r>
-              <a:rPr lang="en-US" altLang="en-US" sz="2400" dirty="0" smtClean="0"/>
-              <a:t>. </a:t>
+              <a:t>The measure of the force applied to a member to produce rotational motion usually measured in meter/kg. </a:t>
             </a:r>
           </a:p>
           <a:p>
@@ -15521,21 +15443,12 @@
               <a:rPr lang="en-US" altLang="en-US" dirty="0" smtClean="0"/>
               <a:t>Angular acceleration is the rate of change of angular velocity over time. </a:t>
             </a:r>
-            <a:endParaRPr lang="en-US" altLang="en-US" dirty="0" smtClean="0"/>
           </a:p>
           <a:p>
             <a:pPr eaLnBrk="1" hangingPunct="1"/>
             <a:r>
               <a:rPr lang="en-US" altLang="en-US" dirty="0" smtClean="0"/>
-              <a:t>It </a:t>
-            </a:r>
-            <a:r>
-              <a:rPr lang="en-US" altLang="en-US" dirty="0" smtClean="0"/>
-              <a:t>is measured in radians per second squared (rad/s2), and is usually denoted by the Greek </a:t>
-            </a:r>
-            <a:r>
-              <a:rPr lang="en-US" altLang="en-US" dirty="0" smtClean="0"/>
-              <a:t>letter </a:t>
+              <a:t>It is measured in radians per second squared (rad/s2), and is usually denoted by the Greek letter </a:t>
             </a:r>
             <a:r>
               <a:rPr lang="el-GR" altLang="en-US" dirty="0" smtClean="0"/>
@@ -15545,7 +15458,6 @@
               <a:rPr lang="en-US" altLang="en-US" dirty="0" smtClean="0"/>
               <a:t>. </a:t>
             </a:r>
-            <a:endParaRPr lang="en-US" altLang="en-US" dirty="0" smtClean="0"/>
           </a:p>
           <a:p>
             <a:pPr eaLnBrk="1" hangingPunct="1"/>

</xml_diff>

<commit_message>
Updated slides and added constraints to PhysicsGame1
</commit_message>
<xml_diff>
--- a/Lectures/Game Engines 7.pptx
+++ b/Lectures/Game Engines 7.pptx
@@ -214,7 +214,7 @@
           <a:p>
             <a:fld id="{D3D2ECF1-FB08-48FC-B45D-807F443755F4}" type="datetimeFigureOut">
               <a:rPr lang="en-IE" smtClean="0"/>
-              <a:t>08/11/2013</a:t>
+              <a:t>19/11/2013</a:t>
             </a:fld>
             <a:endParaRPr lang="en-IE"/>
           </a:p>
@@ -379,7 +379,7 @@
           <a:p>
             <a:fld id="{741081DE-5AEF-4FAD-BA62-F267E0B801CD}" type="datetimeFigureOut">
               <a:rPr lang="en-IE" smtClean="0"/>
-              <a:t>08/11/2013</a:t>
+              <a:t>19/11/2013</a:t>
             </a:fld>
             <a:endParaRPr lang="en-IE"/>
           </a:p>
@@ -4038,7 +4038,7 @@
           <a:p>
             <a:fld id="{3A1FCA75-51D1-4143-BA71-9D0DBE509351}" type="datetimeFigureOut">
               <a:rPr lang="en-IE" smtClean="0"/>
-              <a:t>08/11/2013</a:t>
+              <a:t>19/11/2013</a:t>
             </a:fld>
             <a:endParaRPr lang="en-IE"/>
           </a:p>
@@ -4208,7 +4208,7 @@
           <a:p>
             <a:fld id="{3A1FCA75-51D1-4143-BA71-9D0DBE509351}" type="datetimeFigureOut">
               <a:rPr lang="en-IE" smtClean="0"/>
-              <a:t>08/11/2013</a:t>
+              <a:t>19/11/2013</a:t>
             </a:fld>
             <a:endParaRPr lang="en-IE"/>
           </a:p>
@@ -4388,7 +4388,7 @@
           <a:p>
             <a:fld id="{3A1FCA75-51D1-4143-BA71-9D0DBE509351}" type="datetimeFigureOut">
               <a:rPr lang="en-IE" smtClean="0"/>
-              <a:t>08/11/2013</a:t>
+              <a:t>19/11/2013</a:t>
             </a:fld>
             <a:endParaRPr lang="en-IE"/>
           </a:p>
@@ -4558,7 +4558,7 @@
           <a:p>
             <a:fld id="{3A1FCA75-51D1-4143-BA71-9D0DBE509351}" type="datetimeFigureOut">
               <a:rPr lang="en-IE" smtClean="0"/>
-              <a:t>08/11/2013</a:t>
+              <a:t>19/11/2013</a:t>
             </a:fld>
             <a:endParaRPr lang="en-IE"/>
           </a:p>
@@ -4845,7 +4845,7 @@
           <a:p>
             <a:fld id="{3A1FCA75-51D1-4143-BA71-9D0DBE509351}" type="datetimeFigureOut">
               <a:rPr lang="en-IE" smtClean="0"/>
-              <a:t>08/11/2013</a:t>
+              <a:t>19/11/2013</a:t>
             </a:fld>
             <a:endParaRPr lang="en-IE"/>
           </a:p>
@@ -5133,7 +5133,7 @@
           <a:p>
             <a:fld id="{3A1FCA75-51D1-4143-BA71-9D0DBE509351}" type="datetimeFigureOut">
               <a:rPr lang="en-IE" smtClean="0"/>
-              <a:t>08/11/2013</a:t>
+              <a:t>19/11/2013</a:t>
             </a:fld>
             <a:endParaRPr lang="en-IE"/>
           </a:p>
@@ -5555,7 +5555,7 @@
           <a:p>
             <a:fld id="{3A1FCA75-51D1-4143-BA71-9D0DBE509351}" type="datetimeFigureOut">
               <a:rPr lang="en-IE" smtClean="0"/>
-              <a:t>08/11/2013</a:t>
+              <a:t>19/11/2013</a:t>
             </a:fld>
             <a:endParaRPr lang="en-IE"/>
           </a:p>
@@ -5673,7 +5673,7 @@
           <a:p>
             <a:fld id="{3A1FCA75-51D1-4143-BA71-9D0DBE509351}" type="datetimeFigureOut">
               <a:rPr lang="en-IE" smtClean="0"/>
-              <a:t>08/11/2013</a:t>
+              <a:t>19/11/2013</a:t>
             </a:fld>
             <a:endParaRPr lang="en-IE"/>
           </a:p>
@@ -5768,7 +5768,7 @@
           <a:p>
             <a:fld id="{3A1FCA75-51D1-4143-BA71-9D0DBE509351}" type="datetimeFigureOut">
               <a:rPr lang="en-IE" smtClean="0"/>
-              <a:t>08/11/2013</a:t>
+              <a:t>19/11/2013</a:t>
             </a:fld>
             <a:endParaRPr lang="en-IE"/>
           </a:p>
@@ -6045,7 +6045,7 @@
           <a:p>
             <a:fld id="{3A1FCA75-51D1-4143-BA71-9D0DBE509351}" type="datetimeFigureOut">
               <a:rPr lang="en-IE" smtClean="0"/>
-              <a:t>08/11/2013</a:t>
+              <a:t>19/11/2013</a:t>
             </a:fld>
             <a:endParaRPr lang="en-IE"/>
           </a:p>
@@ -6298,7 +6298,7 @@
           <a:p>
             <a:fld id="{3A1FCA75-51D1-4143-BA71-9D0DBE509351}" type="datetimeFigureOut">
               <a:rPr lang="en-IE" smtClean="0"/>
-              <a:t>08/11/2013</a:t>
+              <a:t>19/11/2013</a:t>
             </a:fld>
             <a:endParaRPr lang="en-IE"/>
           </a:p>
@@ -6511,7 +6511,7 @@
           <a:p>
             <a:fld id="{3A1FCA75-51D1-4143-BA71-9D0DBE509351}" type="datetimeFigureOut">
               <a:rPr lang="en-IE" smtClean="0"/>
-              <a:t>08/11/2013</a:t>
+              <a:t>19/11/2013</a:t>
             </a:fld>
             <a:endParaRPr lang="en-IE"/>
           </a:p>
@@ -7098,11 +7098,7 @@
             </a:r>
             <a:r>
               <a:rPr lang="en-GB" sz="6000" smtClean="0"/>
-              <a:t>Engines </a:t>
-            </a:r>
-            <a:r>
-              <a:rPr lang="en-GB" sz="6000" smtClean="0"/>
-              <a:t>1</a:t>
+              <a:t>Engines 1</a:t>
             </a:r>
             <a:endParaRPr lang="en-GB" sz="6000" dirty="0" smtClean="0"/>
           </a:p>

</xml_diff>